<commit_message>
Add QA (Close #18)
</commit_message>
<xml_diff>
--- a/docs/primeFixture.pptx
+++ b/docs/primeFixture.pptx
@@ -46,7 +46,7 @@
       <p:bold r:id="rId26"/>
     </p:embeddedFont>
     <p:embeddedFont>
-      <p:font typeface="Montserrat Bold" panose="020B0604020202020204" charset="-52"/>
+      <p:font typeface="Montserrat Bold" panose="020B0604020202020204" charset="0"/>
       <p:bold r:id="rId27"/>
     </p:embeddedFont>
   </p:embeddedFontLst>
@@ -6426,6 +6426,75 @@
           </a:prstGeom>
         </p:spPr>
       </p:pic>
+      <p:pic>
+        <p:nvPicPr>
+          <p:cNvPr id="3" name="Picture 2" descr="A green and white logo">
+            <a:extLst>
+              <a:ext uri="{FF2B5EF4-FFF2-40B4-BE49-F238E27FC236}">
+                <a16:creationId xmlns:a16="http://schemas.microsoft.com/office/drawing/2014/main" id="{7F9ADDEC-3D23-40B8-207F-598860C9C041}"/>
+              </a:ext>
+            </a:extLst>
+          </p:cNvPr>
+          <p:cNvPicPr>
+            <a:picLocks noChangeAspect="1"/>
+          </p:cNvPicPr>
+          <p:nvPr/>
+        </p:nvPicPr>
+        <p:blipFill>
+          <a:blip r:embed="rId12">
+            <a:extLst>
+              <a:ext uri="{BEBA8EAE-BF5A-486C-A8C5-ECC9F3942E4B}">
+                <a14:imgProps xmlns:a14="http://schemas.microsoft.com/office/drawing/2010/main">
+                  <a14:imgLayer r:embed="rId13">
+                    <a14:imgEffect>
+                      <a14:backgroundRemoval t="9125" b="91875" l="7000" r="92375">
+                        <a14:foregroundMark x1="79625" y1="29750" x2="79625" y2="29750"/>
+                        <a14:foregroundMark x1="78000" y1="42750" x2="78000" y2="42750"/>
+                        <a14:foregroundMark x1="77500" y1="49250" x2="77500" y2="49250"/>
+                        <a14:foregroundMark x1="80125" y1="60875" x2="80125" y2="60875"/>
+                        <a14:foregroundMark x1="80625" y1="70375" x2="80625" y2="70375"/>
+                        <a14:foregroundMark x1="54375" y1="91875" x2="54375" y2="91875"/>
+                        <a14:foregroundMark x1="7125" y1="59250" x2="7125" y2="59250"/>
+                        <a14:foregroundMark x1="54875" y1="9125" x2="54875" y2="9125"/>
+                        <a14:foregroundMark x1="92375" y1="19375" x2="92375" y2="19375"/>
+                        <a14:foregroundMark x1="25875" y1="45000" x2="25875" y2="45000"/>
+                        <a14:foregroundMark x1="21125" y1="37875" x2="21125" y2="37875"/>
+                        <a14:foregroundMark x1="21125" y1="37875" x2="27875" y2="48875"/>
+                        <a14:foregroundMark x1="36125" y1="39750" x2="29250" y2="49375"/>
+                        <a14:foregroundMark x1="25750" y1="51750" x2="24500" y2="57750"/>
+                        <a14:foregroundMark x1="29625" y1="52000" x2="33625" y2="60500"/>
+                        <a14:foregroundMark x1="62500" y1="22000" x2="88125" y2="23625"/>
+                        <a14:foregroundMark x1="89000" y1="25375" x2="88750" y2="43250"/>
+                        <a14:foregroundMark x1="88750" y1="43250" x2="89000" y2="43625"/>
+                        <a14:foregroundMark x1="69875" y1="25875" x2="69750" y2="34250"/>
+                        <a14:foregroundMark x1="60125" y1="34250" x2="84750" y2="33625"/>
+                        <a14:foregroundMark x1="70375" y1="30125" x2="70625" y2="75250"/>
+                        <a14:foregroundMark x1="62000" y1="77000" x2="79875" y2="76750"/>
+                        <a14:foregroundMark x1="79875" y1="76750" x2="90000" y2="56875"/>
+                        <a14:foregroundMark x1="90000" y1="56875" x2="89875" y2="42500"/>
+                        <a14:foregroundMark x1="64625" y1="45000" x2="64625" y2="45000"/>
+                        <a14:foregroundMark x1="65625" y1="66250" x2="65625" y2="66250"/>
+                      </a14:backgroundRemoval>
+                    </a14:imgEffect>
+                  </a14:imgLayer>
+                </a14:imgProps>
+              </a:ext>
+            </a:extLst>
+          </a:blip>
+          <a:stretch>
+            <a:fillRect/>
+          </a:stretch>
+        </p:blipFill>
+        <p:spPr>
+          <a:xfrm>
+            <a:off x="677896" y="1424329"/>
+            <a:ext cx="865707" cy="865707"/>
+          </a:xfrm>
+          <a:prstGeom prst="rect">
+            <a:avLst/>
+          </a:prstGeom>
+        </p:spPr>
+      </p:pic>
     </p:spTree>
     <p:extLst>
       <p:ext uri="{BB962C8B-B14F-4D97-AF65-F5344CB8AC3E}">
@@ -7120,6 +7189,23 @@
 </file>
 
 <file path=customXml/item1.xml><?xml version="1.0" encoding="utf-8"?>
+<p:properties xmlns:p="http://schemas.microsoft.com/office/2006/metadata/properties" xmlns:xsi="http://www.w3.org/2001/XMLSchema-instance" xmlns:pc="http://schemas.microsoft.com/office/infopath/2007/PartnerControls">
+  <documentManagement>
+    <_activity xmlns="1f3380a6-67f2-419f-a8ce-8c9432a9136a" xsi:nil="true"/>
+  </documentManagement>
+</p:properties>
+</file>
+
+<file path=customXml/item2.xml><?xml version="1.0" encoding="utf-8"?>
+<?mso-contentType ?>
+<FormTemplates xmlns="http://schemas.microsoft.com/sharepoint/v3/contenttype/forms">
+  <Display>DocumentLibraryForm</Display>
+  <Edit>DocumentLibraryForm</Edit>
+  <New>DocumentLibraryForm</New>
+</FormTemplates>
+</file>
+
+<file path=customXml/item3.xml><?xml version="1.0" encoding="utf-8"?>
 <ct:contentTypeSchema xmlns:ct="http://schemas.microsoft.com/office/2006/metadata/contentType" xmlns:ma="http://schemas.microsoft.com/office/2006/metadata/properties/metaAttributes" ct:_="" ma:_="" ma:contentTypeName="Document" ma:contentTypeID="0x01010053FF791CB61BDB419AD4C24D781F5F0D" ma:contentTypeVersion="5" ma:contentTypeDescription="Create a new document." ma:contentTypeScope="" ma:versionID="91bbeaecb5fd2cc120e12d9e7022bcc5">
   <xsd:schema xmlns:xsd="http://www.w3.org/2001/XMLSchema" xmlns:xs="http://www.w3.org/2001/XMLSchema" xmlns:p="http://schemas.microsoft.com/office/2006/metadata/properties" xmlns:ns3="1f3380a6-67f2-419f-a8ce-8c9432a9136a" targetNamespace="http://schemas.microsoft.com/office/2006/metadata/properties" ma:root="true" ma:fieldsID="f3ddd87189735927f183cf02c2d0b769" ns3:_="">
     <xsd:import namespace="1f3380a6-67f2-419f-a8ce-8c9432a9136a"/>
@@ -7269,24 +7355,31 @@
 </ct:contentTypeSchema>
 </file>
 
-<file path=customXml/item2.xml><?xml version="1.0" encoding="utf-8"?>
-<?mso-contentType ?>
-<FormTemplates xmlns="http://schemas.microsoft.com/sharepoint/v3/contenttype/forms">
-  <Display>DocumentLibraryForm</Display>
-  <Edit>DocumentLibraryForm</Edit>
-  <New>DocumentLibraryForm</New>
-</FormTemplates>
+<file path=customXml/itemProps1.xml><?xml version="1.0" encoding="utf-8"?>
+<ds:datastoreItem xmlns:ds="http://schemas.openxmlformats.org/officeDocument/2006/customXml" ds:itemID="{D60384AE-9842-4F34-9DD6-1FB354719325}">
+  <ds:schemaRefs>
+    <ds:schemaRef ds:uri="http://purl.org/dc/dcmitype/"/>
+    <ds:schemaRef ds:uri="http://schemas.microsoft.com/office/infopath/2007/PartnerControls"/>
+    <ds:schemaRef ds:uri="http://schemas.openxmlformats.org/package/2006/metadata/core-properties"/>
+    <ds:schemaRef ds:uri="http://www.w3.org/XML/1998/namespace"/>
+    <ds:schemaRef ds:uri="http://schemas.microsoft.com/office/2006/documentManagement/types"/>
+    <ds:schemaRef ds:uri="1f3380a6-67f2-419f-a8ce-8c9432a9136a"/>
+    <ds:schemaRef ds:uri="http://schemas.microsoft.com/office/2006/metadata/properties"/>
+    <ds:schemaRef ds:uri="http://purl.org/dc/terms/"/>
+    <ds:schemaRef ds:uri="http://purl.org/dc/elements/1.1/"/>
+  </ds:schemaRefs>
+</ds:datastoreItem>
 </file>
 
-<file path=customXml/item3.xml><?xml version="1.0" encoding="utf-8"?>
-<p:properties xmlns:p="http://schemas.microsoft.com/office/2006/metadata/properties" xmlns:xsi="http://www.w3.org/2001/XMLSchema-instance" xmlns:pc="http://schemas.microsoft.com/office/infopath/2007/PartnerControls">
-  <documentManagement>
-    <_activity xmlns="1f3380a6-67f2-419f-a8ce-8c9432a9136a" xsi:nil="true"/>
-  </documentManagement>
-</p:properties>
+<file path=customXml/itemProps2.xml><?xml version="1.0" encoding="utf-8"?>
+<ds:datastoreItem xmlns:ds="http://schemas.openxmlformats.org/officeDocument/2006/customXml" ds:itemID="{23A6270E-93E1-4AC8-B313-7B353803E79B}">
+  <ds:schemaRefs>
+    <ds:schemaRef ds:uri="http://schemas.microsoft.com/sharepoint/v3/contenttype/forms"/>
+  </ds:schemaRefs>
+</ds:datastoreItem>
 </file>
 
-<file path=customXml/itemProps1.xml><?xml version="1.0" encoding="utf-8"?>
+<file path=customXml/itemProps3.xml><?xml version="1.0" encoding="utf-8"?>
 <ds:datastoreItem xmlns:ds="http://schemas.openxmlformats.org/officeDocument/2006/customXml" ds:itemID="{D13CAF06-C85E-4196-9C54-25211E81910A}">
   <ds:schemaRefs>
     <ds:schemaRef ds:uri="http://schemas.microsoft.com/office/2006/metadata/contentType"/>
@@ -7302,28 +7395,4 @@
     <ds:schemaRef ds:uri="http://schemas.microsoft.com/internal/obd"/>
   </ds:schemaRefs>
 </ds:datastoreItem>
-</file>
-
-<file path=customXml/itemProps2.xml><?xml version="1.0" encoding="utf-8"?>
-<ds:datastoreItem xmlns:ds="http://schemas.openxmlformats.org/officeDocument/2006/customXml" ds:itemID="{23A6270E-93E1-4AC8-B313-7B353803E79B}">
-  <ds:schemaRefs>
-    <ds:schemaRef ds:uri="http://schemas.microsoft.com/sharepoint/v3/contenttype/forms"/>
-  </ds:schemaRefs>
-</ds:datastoreItem>
-</file>
-
-<file path=customXml/itemProps3.xml><?xml version="1.0" encoding="utf-8"?>
-<ds:datastoreItem xmlns:ds="http://schemas.openxmlformats.org/officeDocument/2006/customXml" ds:itemID="{D60384AE-9842-4F34-9DD6-1FB354719325}">
-  <ds:schemaRefs>
-    <ds:schemaRef ds:uri="http://purl.org/dc/dcmitype/"/>
-    <ds:schemaRef ds:uri="http://schemas.microsoft.com/office/infopath/2007/PartnerControls"/>
-    <ds:schemaRef ds:uri="http://schemas.openxmlformats.org/package/2006/metadata/core-properties"/>
-    <ds:schemaRef ds:uri="http://www.w3.org/XML/1998/namespace"/>
-    <ds:schemaRef ds:uri="http://schemas.microsoft.com/office/2006/documentManagement/types"/>
-    <ds:schemaRef ds:uri="1f3380a6-67f2-419f-a8ce-8c9432a9136a"/>
-    <ds:schemaRef ds:uri="http://schemas.microsoft.com/office/2006/metadata/properties"/>
-    <ds:schemaRef ds:uri="http://purl.org/dc/terms/"/>
-    <ds:schemaRef ds:uri="http://purl.org/dc/elements/1.1/"/>
-  </ds:schemaRefs>
-</ds:datastoreItem>
 </file>
</xml_diff>